<commit_message>
Fix tokenisations of text 9
</commit_message>
<xml_diff>
--- a/Working with the Taiwan Mandarin Corpus GitHub repository.pptx
+++ b/Working with the Taiwan Mandarin Corpus GitHub repository.pptx
@@ -106,6 +106,11 @@
       </a:defRPr>
     </a:lvl9pPr>
   </p:defaultTextStyle>
+  <p:extLst>
+    <p:ext uri="{EFAFB233-063F-42B5-8137-9DF3F51BA10A}">
+      <p15:sldGuideLst xmlns:p15="http://schemas.microsoft.com/office/powerpoint/2012/main"/>
+    </p:ext>
+  </p:extLst>
 </p:presentation>
 </file>
 
@@ -1775,7 +1780,7 @@
           <a:p>
             <a:fld id="{8F72BA41-EC5B-4197-BCC8-0FD2E523CD7A}" type="datetimeFigureOut">
               <a:rPr lang="en-US" smtClean="0"/>
-              <a:t>10/28/2022</a:t>
+              <a:t>10/31/2022</a:t>
             </a:fld>
             <a:endParaRPr lang="en-US"/>
           </a:p>
@@ -1978,7 +1983,7 @@
           <a:p>
             <a:fld id="{8F72BA41-EC5B-4197-BCC8-0FD2E523CD7A}" type="datetimeFigureOut">
               <a:rPr lang="en-US" smtClean="0"/>
-              <a:t>10/28/2022</a:t>
+              <a:t>10/31/2022</a:t>
             </a:fld>
             <a:endParaRPr lang="en-US"/>
           </a:p>
@@ -3699,7 +3704,7 @@
           <a:p>
             <a:fld id="{8F72BA41-EC5B-4197-BCC8-0FD2E523CD7A}" type="datetimeFigureOut">
               <a:rPr lang="en-US" smtClean="0"/>
-              <a:t>10/28/2022</a:t>
+              <a:t>10/31/2022</a:t>
             </a:fld>
             <a:endParaRPr lang="en-US"/>
           </a:p>
@@ -3898,7 +3903,7 @@
           <a:p>
             <a:fld id="{8F72BA41-EC5B-4197-BCC8-0FD2E523CD7A}" type="datetimeFigureOut">
               <a:rPr lang="en-US" smtClean="0"/>
-              <a:t>10/28/2022</a:t>
+              <a:t>10/31/2022</a:t>
             </a:fld>
             <a:endParaRPr lang="en-US"/>
           </a:p>
@@ -5688,7 +5693,7 @@
           <a:p>
             <a:fld id="{8F72BA41-EC5B-4197-BCC8-0FD2E523CD7A}" type="datetimeFigureOut">
               <a:rPr lang="en-US" smtClean="0"/>
-              <a:t>10/28/2022</a:t>
+              <a:t>10/31/2022</a:t>
             </a:fld>
             <a:endParaRPr lang="en-US"/>
           </a:p>
@@ -5961,7 +5966,7 @@
           <a:p>
             <a:fld id="{8F72BA41-EC5B-4197-BCC8-0FD2E523CD7A}" type="datetimeFigureOut">
               <a:rPr lang="en-US" smtClean="0"/>
-              <a:t>10/28/2022</a:t>
+              <a:t>10/31/2022</a:t>
             </a:fld>
             <a:endParaRPr lang="en-US"/>
           </a:p>
@@ -6381,7 +6386,7 @@
           <a:p>
             <a:fld id="{8F72BA41-EC5B-4197-BCC8-0FD2E523CD7A}" type="datetimeFigureOut">
               <a:rPr lang="en-US" smtClean="0"/>
-              <a:t>10/28/2022</a:t>
+              <a:t>10/31/2022</a:t>
             </a:fld>
             <a:endParaRPr lang="en-US"/>
           </a:p>
@@ -6537,7 +6542,7 @@
           <a:p>
             <a:fld id="{8F72BA41-EC5B-4197-BCC8-0FD2E523CD7A}" type="datetimeFigureOut">
               <a:rPr lang="en-US" smtClean="0"/>
-              <a:t>10/28/2022</a:t>
+              <a:t>10/31/2022</a:t>
             </a:fld>
             <a:endParaRPr lang="en-US"/>
           </a:p>
@@ -8105,7 +8110,7 @@
           <a:p>
             <a:fld id="{8F72BA41-EC5B-4197-BCC8-0FD2E523CD7A}" type="datetimeFigureOut">
               <a:rPr lang="en-US" smtClean="0"/>
-              <a:t>10/28/2022</a:t>
+              <a:t>10/31/2022</a:t>
             </a:fld>
             <a:endParaRPr lang="en-US"/>
           </a:p>
@@ -9956,7 +9961,7 @@
           <a:p>
             <a:fld id="{8F72BA41-EC5B-4197-BCC8-0FD2E523CD7A}" type="datetimeFigureOut">
               <a:rPr lang="en-US" smtClean="0"/>
-              <a:t>10/28/2022</a:t>
+              <a:t>10/31/2022</a:t>
             </a:fld>
             <a:endParaRPr lang="en-US"/>
           </a:p>
@@ -11769,7 +11774,7 @@
           <a:p>
             <a:fld id="{8F72BA41-EC5B-4197-BCC8-0FD2E523CD7A}" type="datetimeFigureOut">
               <a:rPr lang="en-US" smtClean="0"/>
-              <a:t>10/28/2022</a:t>
+              <a:t>10/31/2022</a:t>
             </a:fld>
             <a:endParaRPr lang="en-US"/>
           </a:p>
@@ -13463,7 +13468,7 @@
             <a:fld id="{8F72BA41-EC5B-4197-BCC8-0FD2E523CD7A}" type="datetimeFigureOut">
               <a:rPr lang="en-US" smtClean="0"/>
               <a:pPr/>
-              <a:t>10/28/2022</a:t>
+              <a:t>10/31/2022</a:t>
             </a:fld>
             <a:endParaRPr lang="en-US" dirty="0"/>
           </a:p>
@@ -16305,13 +16310,8 @@
             </a:pPr>
             <a:r>
               <a:rPr lang="en-US" altLang="zh-TW" dirty="0"/>
-              <a:t>Note: Only one person in each pair needs to run the code. Avoid duplicating this process to avoid </a:t>
+              <a:t>Note: Only one person in each pair needs to run the code. Avoid duplicating this process to avoid edit conflicts.</a:t>
             </a:r>
-            <a:r>
-              <a:rPr lang="en-US" altLang="zh-TW"/>
-              <a:t>edit conflicts.</a:t>
-            </a:r>
-            <a:endParaRPr lang="en-US" altLang="zh-TW" dirty="0"/>
           </a:p>
         </p:txBody>
       </p:sp>

</xml_diff>